<commit_message>
Updated the figures in PowerPoint
</commit_message>
<xml_diff>
--- a/Lesson5/img/Recurrent-Figures.pptx
+++ b/Lesson5/img/Recurrent-Figures.pptx
@@ -15,6 +15,8 @@
     <p:sldId id="261" r:id="rId9"/>
     <p:sldId id="262" r:id="rId10"/>
     <p:sldId id="258" r:id="rId11"/>
+    <p:sldId id="266" r:id="rId12"/>
+    <p:sldId id="267" r:id="rId13"/>
   </p:sldIdLst>
   <p:sldSz cx="12192000" cy="6858000"/>
   <p:notesSz cx="6858000" cy="9144000"/>
@@ -268,7 +270,7 @@
           <a:p>
             <a:fld id="{CAC2A0D7-58AF-4646-9F60-9FDD72591F78}" type="datetimeFigureOut">
               <a:rPr lang="en-US" smtClean="0"/>
-              <a:t>5/1/2018</a:t>
+              <a:t>5/9/2018</a:t>
             </a:fld>
             <a:endParaRPr lang="en-US"/>
           </a:p>
@@ -466,7 +468,7 @@
           <a:p>
             <a:fld id="{CAC2A0D7-58AF-4646-9F60-9FDD72591F78}" type="datetimeFigureOut">
               <a:rPr lang="en-US" smtClean="0"/>
-              <a:t>5/1/2018</a:t>
+              <a:t>5/9/2018</a:t>
             </a:fld>
             <a:endParaRPr lang="en-US"/>
           </a:p>
@@ -674,7 +676,7 @@
           <a:p>
             <a:fld id="{CAC2A0D7-58AF-4646-9F60-9FDD72591F78}" type="datetimeFigureOut">
               <a:rPr lang="en-US" smtClean="0"/>
-              <a:t>5/1/2018</a:t>
+              <a:t>5/9/2018</a:t>
             </a:fld>
             <a:endParaRPr lang="en-US"/>
           </a:p>
@@ -872,7 +874,7 @@
           <a:p>
             <a:fld id="{CAC2A0D7-58AF-4646-9F60-9FDD72591F78}" type="datetimeFigureOut">
               <a:rPr lang="en-US" smtClean="0"/>
-              <a:t>5/1/2018</a:t>
+              <a:t>5/9/2018</a:t>
             </a:fld>
             <a:endParaRPr lang="en-US"/>
           </a:p>
@@ -1147,7 +1149,7 @@
           <a:p>
             <a:fld id="{CAC2A0D7-58AF-4646-9F60-9FDD72591F78}" type="datetimeFigureOut">
               <a:rPr lang="en-US" smtClean="0"/>
-              <a:t>5/1/2018</a:t>
+              <a:t>5/9/2018</a:t>
             </a:fld>
             <a:endParaRPr lang="en-US"/>
           </a:p>
@@ -1412,7 +1414,7 @@
           <a:p>
             <a:fld id="{CAC2A0D7-58AF-4646-9F60-9FDD72591F78}" type="datetimeFigureOut">
               <a:rPr lang="en-US" smtClean="0"/>
-              <a:t>5/1/2018</a:t>
+              <a:t>5/9/2018</a:t>
             </a:fld>
             <a:endParaRPr lang="en-US"/>
           </a:p>
@@ -1824,7 +1826,7 @@
           <a:p>
             <a:fld id="{CAC2A0D7-58AF-4646-9F60-9FDD72591F78}" type="datetimeFigureOut">
               <a:rPr lang="en-US" smtClean="0"/>
-              <a:t>5/1/2018</a:t>
+              <a:t>5/9/2018</a:t>
             </a:fld>
             <a:endParaRPr lang="en-US"/>
           </a:p>
@@ -1965,7 +1967,7 @@
           <a:p>
             <a:fld id="{CAC2A0D7-58AF-4646-9F60-9FDD72591F78}" type="datetimeFigureOut">
               <a:rPr lang="en-US" smtClean="0"/>
-              <a:t>5/1/2018</a:t>
+              <a:t>5/9/2018</a:t>
             </a:fld>
             <a:endParaRPr lang="en-US"/>
           </a:p>
@@ -2078,7 +2080,7 @@
           <a:p>
             <a:fld id="{CAC2A0D7-58AF-4646-9F60-9FDD72591F78}" type="datetimeFigureOut">
               <a:rPr lang="en-US" smtClean="0"/>
-              <a:t>5/1/2018</a:t>
+              <a:t>5/9/2018</a:t>
             </a:fld>
             <a:endParaRPr lang="en-US"/>
           </a:p>
@@ -2389,7 +2391,7 @@
           <a:p>
             <a:fld id="{CAC2A0D7-58AF-4646-9F60-9FDD72591F78}" type="datetimeFigureOut">
               <a:rPr lang="en-US" smtClean="0"/>
-              <a:t>5/1/2018</a:t>
+              <a:t>5/9/2018</a:t>
             </a:fld>
             <a:endParaRPr lang="en-US"/>
           </a:p>
@@ -2677,7 +2679,7 @@
           <a:p>
             <a:fld id="{CAC2A0D7-58AF-4646-9F60-9FDD72591F78}" type="datetimeFigureOut">
               <a:rPr lang="en-US" smtClean="0"/>
-              <a:t>5/1/2018</a:t>
+              <a:t>5/9/2018</a:t>
             </a:fld>
             <a:endParaRPr lang="en-US"/>
           </a:p>
@@ -2918,7 +2920,7 @@
           <a:p>
             <a:fld id="{CAC2A0D7-58AF-4646-9F60-9FDD72591F78}" type="datetimeFigureOut">
               <a:rPr lang="en-US" smtClean="0"/>
-              <a:t>5/1/2018</a:t>
+              <a:t>5/9/2018</a:t>
             </a:fld>
             <a:endParaRPr lang="en-US"/>
           </a:p>
@@ -4555,254 +4557,6 @@
           </a:p>
         </p:txBody>
       </p:sp>
-      <p:cxnSp>
-        <p:nvCxnSpPr>
-          <p:cNvPr id="25" name="Straight Arrow Connector 24">
-            <a:extLst>
-              <a:ext uri="{FF2B5EF4-FFF2-40B4-BE49-F238E27FC236}">
-                <a16:creationId xmlns:a16="http://schemas.microsoft.com/office/drawing/2014/main" id="{9542109B-6F34-4892-B1A2-32E9A4619715}"/>
-              </a:ext>
-            </a:extLst>
-          </p:cNvPr>
-          <p:cNvCxnSpPr>
-            <a:cxnSpLocks/>
-          </p:cNvCxnSpPr>
-          <p:nvPr/>
-        </p:nvCxnSpPr>
-        <p:spPr>
-          <a:xfrm flipV="1">
-            <a:off x="4528615" y="4320888"/>
-            <a:ext cx="0" cy="395980"/>
-          </a:xfrm>
-          <a:prstGeom prst="straightConnector1">
-            <a:avLst/>
-          </a:prstGeom>
-          <a:ln w="63500">
-            <a:tailEnd type="triangle"/>
-          </a:ln>
-        </p:spPr>
-        <p:style>
-          <a:lnRef idx="1">
-            <a:schemeClr val="accent1"/>
-          </a:lnRef>
-          <a:fillRef idx="0">
-            <a:schemeClr val="accent1"/>
-          </a:fillRef>
-          <a:effectRef idx="0">
-            <a:schemeClr val="accent1"/>
-          </a:effectRef>
-          <a:fontRef idx="minor">
-            <a:schemeClr val="tx1"/>
-          </a:fontRef>
-        </p:style>
-      </p:cxnSp>
-      <p:grpSp>
-        <p:nvGrpSpPr>
-          <p:cNvPr id="27" name="Group 26">
-            <a:extLst>
-              <a:ext uri="{FF2B5EF4-FFF2-40B4-BE49-F238E27FC236}">
-                <a16:creationId xmlns:a16="http://schemas.microsoft.com/office/drawing/2014/main" id="{C2AFADDC-42E4-4D7B-AC11-CE637E2F437C}"/>
-              </a:ext>
-            </a:extLst>
-          </p:cNvPr>
-          <p:cNvGrpSpPr/>
-          <p:nvPr/>
-        </p:nvGrpSpPr>
-        <p:grpSpPr>
-          <a:xfrm>
-            <a:off x="3989250" y="4716868"/>
-            <a:ext cx="1078730" cy="989907"/>
-            <a:chOff x="4000136" y="4580797"/>
-            <a:chExt cx="1078730" cy="989907"/>
-          </a:xfrm>
-        </p:grpSpPr>
-        <p:sp>
-          <p:nvSpPr>
-            <p:cNvPr id="21" name="Oval 20">
-              <a:extLst>
-                <a:ext uri="{FF2B5EF4-FFF2-40B4-BE49-F238E27FC236}">
-                  <a16:creationId xmlns:a16="http://schemas.microsoft.com/office/drawing/2014/main" id="{D1102C36-E3D8-40BA-B3DE-746F08255365}"/>
-                </a:ext>
-              </a:extLst>
-            </p:cNvPr>
-            <p:cNvSpPr/>
-            <p:nvPr/>
-          </p:nvSpPr>
-          <p:spPr>
-            <a:xfrm>
-              <a:off x="4000136" y="4580797"/>
-              <a:ext cx="1078730" cy="989907"/>
-            </a:xfrm>
-            <a:prstGeom prst="ellipse">
-              <a:avLst/>
-            </a:prstGeom>
-            <a:solidFill>
-              <a:schemeClr val="bg1">
-                <a:lumMod val="75000"/>
-              </a:schemeClr>
-            </a:solidFill>
-            <a:ln w="25400"/>
-          </p:spPr>
-          <p:style>
-            <a:lnRef idx="2">
-              <a:schemeClr val="accent1">
-                <a:shade val="50000"/>
-              </a:schemeClr>
-            </a:lnRef>
-            <a:fillRef idx="1">
-              <a:schemeClr val="accent1"/>
-            </a:fillRef>
-            <a:effectRef idx="0">
-              <a:schemeClr val="accent1"/>
-            </a:effectRef>
-            <a:fontRef idx="minor">
-              <a:schemeClr val="lt1"/>
-            </a:fontRef>
-          </p:style>
-          <p:txBody>
-            <a:bodyPr rtlCol="0" anchor="ctr"/>
-            <a:lstStyle/>
-            <a:p>
-              <a:pPr algn="ctr"/>
-              <a:endParaRPr lang="en-US" sz="2800" b="1" dirty="0">
-                <a:solidFill>
-                  <a:schemeClr val="tx1"/>
-                </a:solidFill>
-              </a:endParaRPr>
-            </a:p>
-          </p:txBody>
-        </p:sp>
-        <p:sp>
-          <p:nvSpPr>
-            <p:cNvPr id="26" name="Freeform: Shape 25">
-              <a:extLst>
-                <a:ext uri="{FF2B5EF4-FFF2-40B4-BE49-F238E27FC236}">
-                  <a16:creationId xmlns:a16="http://schemas.microsoft.com/office/drawing/2014/main" id="{2E139D8A-1FFE-4B96-AFFA-449BF7DEE183}"/>
-                </a:ext>
-              </a:extLst>
-            </p:cNvPr>
-            <p:cNvSpPr/>
-            <p:nvPr/>
-          </p:nvSpPr>
-          <p:spPr>
-            <a:xfrm>
-              <a:off x="4207489" y="4935276"/>
-              <a:ext cx="664024" cy="306232"/>
-            </a:xfrm>
-            <a:custGeom>
-              <a:avLst/>
-              <a:gdLst>
-                <a:gd name="connsiteX0" fmla="*/ 0 w 1382486"/>
-                <a:gd name="connsiteY0" fmla="*/ 557584 h 571353"/>
-                <a:gd name="connsiteX1" fmla="*/ 517072 w 1382486"/>
-                <a:gd name="connsiteY1" fmla="*/ 563027 h 571353"/>
-                <a:gd name="connsiteX2" fmla="*/ 707572 w 1382486"/>
-                <a:gd name="connsiteY2" fmla="*/ 459613 h 571353"/>
-                <a:gd name="connsiteX3" fmla="*/ 783772 w 1382486"/>
-                <a:gd name="connsiteY3" fmla="*/ 307213 h 571353"/>
-                <a:gd name="connsiteX4" fmla="*/ 859972 w 1382486"/>
-                <a:gd name="connsiteY4" fmla="*/ 89499 h 571353"/>
-                <a:gd name="connsiteX5" fmla="*/ 1039586 w 1382486"/>
-                <a:gd name="connsiteY5" fmla="*/ 7856 h 571353"/>
-                <a:gd name="connsiteX6" fmla="*/ 1382486 w 1382486"/>
-                <a:gd name="connsiteY6" fmla="*/ 7856 h 571353"/>
-              </a:gdLst>
-              <a:ahLst/>
-              <a:cxnLst>
-                <a:cxn ang="0">
-                  <a:pos x="connsiteX0" y="connsiteY0"/>
-                </a:cxn>
-                <a:cxn ang="0">
-                  <a:pos x="connsiteX1" y="connsiteY1"/>
-                </a:cxn>
-                <a:cxn ang="0">
-                  <a:pos x="connsiteX2" y="connsiteY2"/>
-                </a:cxn>
-                <a:cxn ang="0">
-                  <a:pos x="connsiteX3" y="connsiteY3"/>
-                </a:cxn>
-                <a:cxn ang="0">
-                  <a:pos x="connsiteX4" y="connsiteY4"/>
-                </a:cxn>
-                <a:cxn ang="0">
-                  <a:pos x="connsiteX5" y="connsiteY5"/>
-                </a:cxn>
-                <a:cxn ang="0">
-                  <a:pos x="connsiteX6" y="connsiteY6"/>
-                </a:cxn>
-              </a:cxnLst>
-              <a:rect l="l" t="t" r="r" b="b"/>
-              <a:pathLst>
-                <a:path w="1382486" h="571353">
-                  <a:moveTo>
-                    <a:pt x="0" y="557584"/>
-                  </a:moveTo>
-                  <a:cubicBezTo>
-                    <a:pt x="199571" y="568470"/>
-                    <a:pt x="399143" y="579356"/>
-                    <a:pt x="517072" y="563027"/>
-                  </a:cubicBezTo>
-                  <a:cubicBezTo>
-                    <a:pt x="635001" y="546698"/>
-                    <a:pt x="663122" y="502249"/>
-                    <a:pt x="707572" y="459613"/>
-                  </a:cubicBezTo>
-                  <a:cubicBezTo>
-                    <a:pt x="752022" y="416977"/>
-                    <a:pt x="758372" y="368899"/>
-                    <a:pt x="783772" y="307213"/>
-                  </a:cubicBezTo>
-                  <a:cubicBezTo>
-                    <a:pt x="809172" y="245527"/>
-                    <a:pt x="817336" y="139392"/>
-                    <a:pt x="859972" y="89499"/>
-                  </a:cubicBezTo>
-                  <a:cubicBezTo>
-                    <a:pt x="902608" y="39606"/>
-                    <a:pt x="952500" y="21463"/>
-                    <a:pt x="1039586" y="7856"/>
-                  </a:cubicBezTo>
-                  <a:cubicBezTo>
-                    <a:pt x="1126672" y="-5751"/>
-                    <a:pt x="1254579" y="1052"/>
-                    <a:pt x="1382486" y="7856"/>
-                  </a:cubicBezTo>
-                </a:path>
-              </a:pathLst>
-            </a:custGeom>
-            <a:noFill/>
-            <a:ln w="25400">
-              <a:solidFill>
-                <a:schemeClr val="tx1"/>
-              </a:solidFill>
-            </a:ln>
-          </p:spPr>
-          <p:style>
-            <a:lnRef idx="2">
-              <a:schemeClr val="accent1">
-                <a:shade val="50000"/>
-              </a:schemeClr>
-            </a:lnRef>
-            <a:fillRef idx="1">
-              <a:schemeClr val="accent1"/>
-            </a:fillRef>
-            <a:effectRef idx="0">
-              <a:schemeClr val="accent1"/>
-            </a:effectRef>
-            <a:fontRef idx="minor">
-              <a:schemeClr val="lt1"/>
-            </a:fontRef>
-          </p:style>
-          <p:txBody>
-            <a:bodyPr rtlCol="0" anchor="ctr"/>
-            <a:lstStyle/>
-            <a:p>
-              <a:pPr algn="ctr"/>
-              <a:endParaRPr lang="en-US"/>
-            </a:p>
-          </p:txBody>
-        </p:sp>
-      </p:grpSp>
       <p:grpSp>
         <p:nvGrpSpPr>
           <p:cNvPr id="28" name="Group 27">
@@ -5651,56 +5405,14 @@
           </p:cNvPr>
           <p:cNvCxnSpPr>
             <a:cxnSpLocks/>
-            <a:endCxn id="21" idx="4"/>
+            <a:endCxn id="20" idx="4"/>
           </p:cNvCxnSpPr>
           <p:nvPr/>
         </p:nvCxnSpPr>
         <p:spPr>
           <a:xfrm flipH="1" flipV="1">
-            <a:off x="4528615" y="5706775"/>
-            <a:ext cx="26960" cy="1058696"/>
-          </a:xfrm>
-          <a:prstGeom prst="straightConnector1">
-            <a:avLst/>
-          </a:prstGeom>
-          <a:ln w="63500">
-            <a:tailEnd type="triangle"/>
-          </a:ln>
-        </p:spPr>
-        <p:style>
-          <a:lnRef idx="1">
-            <a:schemeClr val="accent1"/>
-          </a:lnRef>
-          <a:fillRef idx="0">
-            <a:schemeClr val="accent1"/>
-          </a:fillRef>
-          <a:effectRef idx="0">
-            <a:schemeClr val="accent1"/>
-          </a:effectRef>
-          <a:fontRef idx="minor">
-            <a:schemeClr val="tx1"/>
-          </a:fontRef>
-        </p:style>
-      </p:cxnSp>
-      <p:cxnSp>
-        <p:nvCxnSpPr>
-          <p:cNvPr id="58" name="Straight Arrow Connector 57">
-            <a:extLst>
-              <a:ext uri="{FF2B5EF4-FFF2-40B4-BE49-F238E27FC236}">
-                <a16:creationId xmlns:a16="http://schemas.microsoft.com/office/drawing/2014/main" id="{A8DA2012-3FE0-48BB-AC9C-E7B27E6AE2E8}"/>
-              </a:ext>
-            </a:extLst>
-          </p:cNvPr>
-          <p:cNvCxnSpPr>
-            <a:cxnSpLocks/>
-            <a:endCxn id="21" idx="5"/>
-          </p:cNvCxnSpPr>
-          <p:nvPr/>
-        </p:nvCxnSpPr>
-        <p:spPr>
-          <a:xfrm flipH="1" flipV="1">
-            <a:off x="4910004" y="5561806"/>
-            <a:ext cx="446972" cy="1132908"/>
+            <a:off x="4528615" y="4362389"/>
+            <a:ext cx="26960" cy="2403082"/>
           </a:xfrm>
           <a:prstGeom prst="straightConnector1">
             <a:avLst/>
@@ -5743,132 +5455,6 @@
           <a:xfrm flipH="1" flipV="1">
             <a:off x="6357511" y="5719416"/>
             <a:ext cx="26960" cy="1046055"/>
-          </a:xfrm>
-          <a:prstGeom prst="straightConnector1">
-            <a:avLst/>
-          </a:prstGeom>
-          <a:ln w="63500">
-            <a:tailEnd type="triangle"/>
-          </a:ln>
-        </p:spPr>
-        <p:style>
-          <a:lnRef idx="1">
-            <a:schemeClr val="accent1"/>
-          </a:lnRef>
-          <a:fillRef idx="0">
-            <a:schemeClr val="accent1"/>
-          </a:fillRef>
-          <a:effectRef idx="0">
-            <a:schemeClr val="accent1"/>
-          </a:effectRef>
-          <a:fontRef idx="minor">
-            <a:schemeClr val="tx1"/>
-          </a:fontRef>
-        </p:style>
-      </p:cxnSp>
-      <p:cxnSp>
-        <p:nvCxnSpPr>
-          <p:cNvPr id="65" name="Straight Arrow Connector 64">
-            <a:extLst>
-              <a:ext uri="{FF2B5EF4-FFF2-40B4-BE49-F238E27FC236}">
-                <a16:creationId xmlns:a16="http://schemas.microsoft.com/office/drawing/2014/main" id="{13B0B874-56B9-480F-8E6D-EB7B91A77327}"/>
-              </a:ext>
-            </a:extLst>
-          </p:cNvPr>
-          <p:cNvCxnSpPr>
-            <a:cxnSpLocks/>
-            <a:endCxn id="29" idx="5"/>
-          </p:cNvCxnSpPr>
-          <p:nvPr/>
-        </p:nvCxnSpPr>
-        <p:spPr>
-          <a:xfrm flipH="1" flipV="1">
-            <a:off x="6738900" y="5574447"/>
-            <a:ext cx="372368" cy="1212796"/>
-          </a:xfrm>
-          <a:prstGeom prst="straightConnector1">
-            <a:avLst/>
-          </a:prstGeom>
-          <a:ln w="63500">
-            <a:tailEnd type="triangle"/>
-          </a:ln>
-        </p:spPr>
-        <p:style>
-          <a:lnRef idx="1">
-            <a:schemeClr val="accent1"/>
-          </a:lnRef>
-          <a:fillRef idx="0">
-            <a:schemeClr val="accent1"/>
-          </a:fillRef>
-          <a:effectRef idx="0">
-            <a:schemeClr val="accent1"/>
-          </a:effectRef>
-          <a:fontRef idx="minor">
-            <a:schemeClr val="tx1"/>
-          </a:fontRef>
-        </p:style>
-      </p:cxnSp>
-      <p:cxnSp>
-        <p:nvCxnSpPr>
-          <p:cNvPr id="68" name="Straight Arrow Connector 67">
-            <a:extLst>
-              <a:ext uri="{FF2B5EF4-FFF2-40B4-BE49-F238E27FC236}">
-                <a16:creationId xmlns:a16="http://schemas.microsoft.com/office/drawing/2014/main" id="{CDC85EEC-3552-45F8-A0DE-AB3B0F2ADFBA}"/>
-              </a:ext>
-            </a:extLst>
-          </p:cNvPr>
-          <p:cNvCxnSpPr>
-            <a:cxnSpLocks/>
-            <a:endCxn id="32" idx="5"/>
-          </p:cNvCxnSpPr>
-          <p:nvPr/>
-        </p:nvCxnSpPr>
-        <p:spPr>
-          <a:xfrm flipH="1" flipV="1">
-            <a:off x="8567796" y="5587088"/>
-            <a:ext cx="346876" cy="1187514"/>
-          </a:xfrm>
-          <a:prstGeom prst="straightConnector1">
-            <a:avLst/>
-          </a:prstGeom>
-          <a:ln w="63500">
-            <a:tailEnd type="triangle"/>
-          </a:ln>
-        </p:spPr>
-        <p:style>
-          <a:lnRef idx="1">
-            <a:schemeClr val="accent1"/>
-          </a:lnRef>
-          <a:fillRef idx="0">
-            <a:schemeClr val="accent1"/>
-          </a:fillRef>
-          <a:effectRef idx="0">
-            <a:schemeClr val="accent1"/>
-          </a:effectRef>
-          <a:fontRef idx="minor">
-            <a:schemeClr val="tx1"/>
-          </a:fontRef>
-        </p:style>
-      </p:cxnSp>
-      <p:cxnSp>
-        <p:nvCxnSpPr>
-          <p:cNvPr id="70" name="Straight Arrow Connector 69">
-            <a:extLst>
-              <a:ext uri="{FF2B5EF4-FFF2-40B4-BE49-F238E27FC236}">
-                <a16:creationId xmlns:a16="http://schemas.microsoft.com/office/drawing/2014/main" id="{5290DFD6-A98E-475E-B90C-CC4DB3947B7B}"/>
-              </a:ext>
-            </a:extLst>
-          </p:cNvPr>
-          <p:cNvCxnSpPr>
-            <a:cxnSpLocks/>
-            <a:endCxn id="35" idx="5"/>
-          </p:cNvCxnSpPr>
-          <p:nvPr/>
-        </p:nvCxnSpPr>
-        <p:spPr>
-          <a:xfrm flipH="1" flipV="1">
-            <a:off x="10396692" y="5599729"/>
-            <a:ext cx="346876" cy="1187514"/>
           </a:xfrm>
           <a:prstGeom prst="straightConnector1">
             <a:avLst/>
@@ -6540,6 +6126,1646 @@
     <p:extLst>
       <p:ext uri="{BB962C8B-B14F-4D97-AF65-F5344CB8AC3E}">
         <p14:creationId xmlns:p14="http://schemas.microsoft.com/office/powerpoint/2010/main" val="2182092470"/>
+      </p:ext>
+    </p:extLst>
+  </p:cSld>
+  <p:clrMapOvr>
+    <a:masterClrMapping/>
+  </p:clrMapOvr>
+</p:sld>
+</file>
+
+<file path=ppt/slides/slide11.xml><?xml version="1.0" encoding="utf-8"?>
+<p:sld xmlns:a="http://schemas.openxmlformats.org/drawingml/2006/main" xmlns:r="http://schemas.openxmlformats.org/officeDocument/2006/relationships" xmlns:p="http://schemas.openxmlformats.org/presentationml/2006/main">
+  <p:cSld>
+    <p:spTree>
+      <p:nvGrpSpPr>
+        <p:cNvPr id="1" name=""/>
+        <p:cNvGrpSpPr/>
+        <p:nvPr/>
+      </p:nvGrpSpPr>
+      <p:grpSpPr>
+        <a:xfrm>
+          <a:off x="0" y="0"/>
+          <a:ext cx="0" cy="0"/>
+          <a:chOff x="0" y="0"/>
+          <a:chExt cx="0" cy="0"/>
+        </a:xfrm>
+      </p:grpSpPr>
+      <p:sp>
+        <p:nvSpPr>
+          <p:cNvPr id="2" name="Oval 1">
+            <a:extLst>
+              <a:ext uri="{FF2B5EF4-FFF2-40B4-BE49-F238E27FC236}">
+                <a16:creationId xmlns:a16="http://schemas.microsoft.com/office/drawing/2014/main" id="{BBD2C724-535D-43E9-A19F-B516447ADB7F}"/>
+              </a:ext>
+            </a:extLst>
+          </p:cNvPr>
+          <p:cNvSpPr/>
+          <p:nvPr/>
+        </p:nvSpPr>
+        <p:spPr>
+          <a:xfrm>
+            <a:off x="6384142" y="2669478"/>
+            <a:ext cx="1078730" cy="989907"/>
+          </a:xfrm>
+          <a:prstGeom prst="ellipse">
+            <a:avLst/>
+          </a:prstGeom>
+          <a:noFill/>
+          <a:ln w="25400"/>
+        </p:spPr>
+        <p:style>
+          <a:lnRef idx="2">
+            <a:schemeClr val="accent1">
+              <a:shade val="50000"/>
+            </a:schemeClr>
+          </a:lnRef>
+          <a:fillRef idx="1">
+            <a:schemeClr val="accent1"/>
+          </a:fillRef>
+          <a:effectRef idx="0">
+            <a:schemeClr val="accent1"/>
+          </a:effectRef>
+          <a:fontRef idx="minor">
+            <a:schemeClr val="lt1"/>
+          </a:fontRef>
+        </p:style>
+        <p:txBody>
+          <a:bodyPr rtlCol="0" anchor="ctr"/>
+          <a:lstStyle/>
+          <a:p>
+            <a:pPr algn="ctr"/>
+            <a:r>
+              <a:rPr lang="en-US" sz="2800" b="1" dirty="0">
+                <a:solidFill>
+                  <a:schemeClr val="tx1"/>
+                </a:solidFill>
+              </a:rPr>
+              <a:t>X</a:t>
+            </a:r>
+          </a:p>
+        </p:txBody>
+      </p:sp>
+      <p:sp>
+        <p:nvSpPr>
+          <p:cNvPr id="3" name="Oval 2">
+            <a:extLst>
+              <a:ext uri="{FF2B5EF4-FFF2-40B4-BE49-F238E27FC236}">
+                <a16:creationId xmlns:a16="http://schemas.microsoft.com/office/drawing/2014/main" id="{8D4C2B04-F51A-46D8-8CF3-5B49924DB381}"/>
+              </a:ext>
+            </a:extLst>
+          </p:cNvPr>
+          <p:cNvSpPr/>
+          <p:nvPr/>
+        </p:nvSpPr>
+        <p:spPr>
+          <a:xfrm>
+            <a:off x="4345792" y="739078"/>
+            <a:ext cx="1078730" cy="989907"/>
+          </a:xfrm>
+          <a:prstGeom prst="ellipse">
+            <a:avLst/>
+          </a:prstGeom>
+          <a:noFill/>
+          <a:ln w="25400"/>
+        </p:spPr>
+        <p:style>
+          <a:lnRef idx="2">
+            <a:schemeClr val="accent1">
+              <a:shade val="50000"/>
+            </a:schemeClr>
+          </a:lnRef>
+          <a:fillRef idx="1">
+            <a:schemeClr val="accent1"/>
+          </a:fillRef>
+          <a:effectRef idx="0">
+            <a:schemeClr val="accent1"/>
+          </a:effectRef>
+          <a:fontRef idx="minor">
+            <a:schemeClr val="lt1"/>
+          </a:fontRef>
+        </p:style>
+        <p:txBody>
+          <a:bodyPr rtlCol="0" anchor="ctr"/>
+          <a:lstStyle/>
+          <a:p>
+            <a:pPr algn="ctr"/>
+            <a:r>
+              <a:rPr lang="en-US" sz="2800" b="1" dirty="0">
+                <a:solidFill>
+                  <a:schemeClr val="tx1"/>
+                </a:solidFill>
+              </a:rPr>
+              <a:t>X</a:t>
+            </a:r>
+          </a:p>
+        </p:txBody>
+      </p:sp>
+      <p:sp>
+        <p:nvSpPr>
+          <p:cNvPr id="4" name="Oval 3">
+            <a:extLst>
+              <a:ext uri="{FF2B5EF4-FFF2-40B4-BE49-F238E27FC236}">
+                <a16:creationId xmlns:a16="http://schemas.microsoft.com/office/drawing/2014/main" id="{852F2566-0EFD-4465-A419-5E2F14FF1C30}"/>
+              </a:ext>
+            </a:extLst>
+          </p:cNvPr>
+          <p:cNvSpPr/>
+          <p:nvPr/>
+        </p:nvSpPr>
+        <p:spPr>
+          <a:xfrm>
+            <a:off x="4371010" y="2669478"/>
+            <a:ext cx="1078730" cy="989907"/>
+          </a:xfrm>
+          <a:prstGeom prst="ellipse">
+            <a:avLst/>
+          </a:prstGeom>
+          <a:noFill/>
+          <a:ln w="25400"/>
+        </p:spPr>
+        <p:style>
+          <a:lnRef idx="2">
+            <a:schemeClr val="accent1">
+              <a:shade val="50000"/>
+            </a:schemeClr>
+          </a:lnRef>
+          <a:fillRef idx="1">
+            <a:schemeClr val="accent1"/>
+          </a:fillRef>
+          <a:effectRef idx="0">
+            <a:schemeClr val="accent1"/>
+          </a:effectRef>
+          <a:fontRef idx="minor">
+            <a:schemeClr val="lt1"/>
+          </a:fontRef>
+        </p:style>
+        <p:txBody>
+          <a:bodyPr rtlCol="0" anchor="ctr"/>
+          <a:lstStyle/>
+          <a:p>
+            <a:pPr algn="ctr"/>
+            <a:r>
+              <a:rPr lang="en-US" sz="2800" b="1" dirty="0">
+                <a:solidFill>
+                  <a:schemeClr val="tx1"/>
+                </a:solidFill>
+              </a:rPr>
+              <a:t>h</a:t>
+            </a:r>
+          </a:p>
+        </p:txBody>
+      </p:sp>
+      <p:sp>
+        <p:nvSpPr>
+          <p:cNvPr id="5" name="Oval 4">
+            <a:extLst>
+              <a:ext uri="{FF2B5EF4-FFF2-40B4-BE49-F238E27FC236}">
+                <a16:creationId xmlns:a16="http://schemas.microsoft.com/office/drawing/2014/main" id="{5F024AFE-43EE-40A9-96FE-D36EEA5AF95E}"/>
+              </a:ext>
+            </a:extLst>
+          </p:cNvPr>
+          <p:cNvSpPr/>
+          <p:nvPr/>
+        </p:nvSpPr>
+        <p:spPr>
+          <a:xfrm>
+            <a:off x="8644742" y="2669477"/>
+            <a:ext cx="1078730" cy="989907"/>
+          </a:xfrm>
+          <a:prstGeom prst="ellipse">
+            <a:avLst/>
+          </a:prstGeom>
+          <a:noFill/>
+          <a:ln w="25400"/>
+        </p:spPr>
+        <p:style>
+          <a:lnRef idx="2">
+            <a:schemeClr val="accent1">
+              <a:shade val="50000"/>
+            </a:schemeClr>
+          </a:lnRef>
+          <a:fillRef idx="1">
+            <a:schemeClr val="accent1"/>
+          </a:fillRef>
+          <a:effectRef idx="0">
+            <a:schemeClr val="accent1"/>
+          </a:effectRef>
+          <a:fontRef idx="minor">
+            <a:schemeClr val="lt1"/>
+          </a:fontRef>
+        </p:style>
+        <p:txBody>
+          <a:bodyPr rtlCol="0" anchor="ctr"/>
+          <a:lstStyle/>
+          <a:p>
+            <a:pPr algn="ctr"/>
+            <a:r>
+              <a:rPr lang="en-US" sz="2800" b="1" dirty="0">
+                <a:solidFill>
+                  <a:schemeClr val="tx1"/>
+                </a:solidFill>
+              </a:rPr>
+              <a:t>h</a:t>
+            </a:r>
+          </a:p>
+        </p:txBody>
+      </p:sp>
+      <p:cxnSp>
+        <p:nvCxnSpPr>
+          <p:cNvPr id="8" name="Connector: Curved 7">
+            <a:extLst>
+              <a:ext uri="{FF2B5EF4-FFF2-40B4-BE49-F238E27FC236}">
+                <a16:creationId xmlns:a16="http://schemas.microsoft.com/office/drawing/2014/main" id="{362C3166-4B45-4D51-83B0-90280DC41600}"/>
+              </a:ext>
+            </a:extLst>
+          </p:cNvPr>
+          <p:cNvCxnSpPr>
+            <a:cxnSpLocks/>
+          </p:cNvCxnSpPr>
+          <p:nvPr/>
+        </p:nvCxnSpPr>
+        <p:spPr>
+          <a:xfrm flipV="1">
+            <a:off x="9075249" y="2857501"/>
+            <a:ext cx="217715" cy="130627"/>
+          </a:xfrm>
+          <a:prstGeom prst="curvedConnector3">
+            <a:avLst/>
+          </a:prstGeom>
+          <a:ln w="50800">
+            <a:solidFill>
+              <a:schemeClr val="tx1"/>
+            </a:solidFill>
+          </a:ln>
+        </p:spPr>
+        <p:style>
+          <a:lnRef idx="1">
+            <a:schemeClr val="accent1"/>
+          </a:lnRef>
+          <a:fillRef idx="0">
+            <a:schemeClr val="accent1"/>
+          </a:fillRef>
+          <a:effectRef idx="0">
+            <a:schemeClr val="accent1"/>
+          </a:effectRef>
+          <a:fontRef idx="minor">
+            <a:schemeClr val="tx1"/>
+          </a:fontRef>
+        </p:style>
+      </p:cxnSp>
+      <p:cxnSp>
+        <p:nvCxnSpPr>
+          <p:cNvPr id="13" name="Straight Arrow Connector 12">
+            <a:extLst>
+              <a:ext uri="{FF2B5EF4-FFF2-40B4-BE49-F238E27FC236}">
+                <a16:creationId xmlns:a16="http://schemas.microsoft.com/office/drawing/2014/main" id="{0E20F8DF-9149-4E09-A625-171BBE0570F6}"/>
+              </a:ext>
+            </a:extLst>
+          </p:cNvPr>
+          <p:cNvCxnSpPr>
+            <a:cxnSpLocks/>
+            <a:endCxn id="5" idx="6"/>
+          </p:cNvCxnSpPr>
+          <p:nvPr/>
+        </p:nvCxnSpPr>
+        <p:spPr>
+          <a:xfrm flipH="1">
+            <a:off x="9723472" y="3164430"/>
+            <a:ext cx="648437" cy="1"/>
+          </a:xfrm>
+          <a:prstGeom prst="straightConnector1">
+            <a:avLst/>
+          </a:prstGeom>
+          <a:ln w="63500">
+            <a:tailEnd type="triangle"/>
+          </a:ln>
+        </p:spPr>
+        <p:style>
+          <a:lnRef idx="1">
+            <a:schemeClr val="accent1"/>
+          </a:lnRef>
+          <a:fillRef idx="0">
+            <a:schemeClr val="accent1"/>
+          </a:fillRef>
+          <a:effectRef idx="0">
+            <a:schemeClr val="accent1"/>
+          </a:effectRef>
+          <a:fontRef idx="minor">
+            <a:schemeClr val="tx1"/>
+          </a:fontRef>
+        </p:style>
+      </p:cxnSp>
+      <p:sp>
+        <p:nvSpPr>
+          <p:cNvPr id="18" name="TextBox 17">
+            <a:extLst>
+              <a:ext uri="{FF2B5EF4-FFF2-40B4-BE49-F238E27FC236}">
+                <a16:creationId xmlns:a16="http://schemas.microsoft.com/office/drawing/2014/main" id="{87F63097-F0C1-4A80-B8B3-4CA99D8E822F}"/>
+              </a:ext>
+            </a:extLst>
+          </p:cNvPr>
+          <p:cNvSpPr txBox="1"/>
+          <p:nvPr/>
+        </p:nvSpPr>
+        <p:spPr>
+          <a:xfrm>
+            <a:off x="10474834" y="2964375"/>
+            <a:ext cx="430508" cy="400110"/>
+          </a:xfrm>
+          <a:prstGeom prst="rect">
+            <a:avLst/>
+          </a:prstGeom>
+          <a:noFill/>
+        </p:spPr>
+        <p:txBody>
+          <a:bodyPr wrap="square" rtlCol="0">
+            <a:spAutoFit/>
+          </a:bodyPr>
+          <a:lstStyle/>
+          <a:p>
+            <a:r>
+              <a:rPr lang="en-US" sz="2000" b="1" dirty="0"/>
+              <a:t>IN</a:t>
+            </a:r>
+          </a:p>
+        </p:txBody>
+      </p:sp>
+      <p:cxnSp>
+        <p:nvCxnSpPr>
+          <p:cNvPr id="19" name="Straight Arrow Connector 18">
+            <a:extLst>
+              <a:ext uri="{FF2B5EF4-FFF2-40B4-BE49-F238E27FC236}">
+                <a16:creationId xmlns:a16="http://schemas.microsoft.com/office/drawing/2014/main" id="{9425D226-1D48-46F0-8F04-3F38833E0A68}"/>
+              </a:ext>
+            </a:extLst>
+          </p:cNvPr>
+          <p:cNvCxnSpPr>
+            <a:cxnSpLocks/>
+          </p:cNvCxnSpPr>
+          <p:nvPr/>
+        </p:nvCxnSpPr>
+        <p:spPr>
+          <a:xfrm flipH="1">
+            <a:off x="5447565" y="1245717"/>
+            <a:ext cx="3731269" cy="0"/>
+          </a:xfrm>
+          <a:prstGeom prst="straightConnector1">
+            <a:avLst/>
+          </a:prstGeom>
+          <a:ln w="63500">
+            <a:tailEnd type="triangle"/>
+          </a:ln>
+        </p:spPr>
+        <p:style>
+          <a:lnRef idx="1">
+            <a:schemeClr val="accent1"/>
+          </a:lnRef>
+          <a:fillRef idx="0">
+            <a:schemeClr val="accent1"/>
+          </a:fillRef>
+          <a:effectRef idx="0">
+            <a:schemeClr val="accent1"/>
+          </a:effectRef>
+          <a:fontRef idx="minor">
+            <a:schemeClr val="tx1"/>
+          </a:fontRef>
+        </p:style>
+      </p:cxnSp>
+      <p:cxnSp>
+        <p:nvCxnSpPr>
+          <p:cNvPr id="23" name="Straight Connector 22">
+            <a:extLst>
+              <a:ext uri="{FF2B5EF4-FFF2-40B4-BE49-F238E27FC236}">
+                <a16:creationId xmlns:a16="http://schemas.microsoft.com/office/drawing/2014/main" id="{D0515EE9-C368-4803-897A-0AC0755E422A}"/>
+              </a:ext>
+            </a:extLst>
+          </p:cNvPr>
+          <p:cNvCxnSpPr>
+            <a:cxnSpLocks/>
+            <a:endCxn id="5" idx="0"/>
+          </p:cNvCxnSpPr>
+          <p:nvPr/>
+        </p:nvCxnSpPr>
+        <p:spPr>
+          <a:xfrm>
+            <a:off x="9178834" y="1245717"/>
+            <a:ext cx="5273" cy="1423760"/>
+          </a:xfrm>
+          <a:prstGeom prst="line">
+            <a:avLst/>
+          </a:prstGeom>
+          <a:ln w="63500"/>
+        </p:spPr>
+        <p:style>
+          <a:lnRef idx="1">
+            <a:schemeClr val="accent1"/>
+          </a:lnRef>
+          <a:fillRef idx="0">
+            <a:schemeClr val="accent1"/>
+          </a:fillRef>
+          <a:effectRef idx="0">
+            <a:schemeClr val="accent1"/>
+          </a:effectRef>
+          <a:fontRef idx="minor">
+            <a:schemeClr val="tx1"/>
+          </a:fontRef>
+        </p:style>
+      </p:cxnSp>
+      <p:cxnSp>
+        <p:nvCxnSpPr>
+          <p:cNvPr id="29" name="Straight Arrow Connector 28">
+            <a:extLst>
+              <a:ext uri="{FF2B5EF4-FFF2-40B4-BE49-F238E27FC236}">
+                <a16:creationId xmlns:a16="http://schemas.microsoft.com/office/drawing/2014/main" id="{204CF7BF-BE45-4540-820A-64D6FFDF19BC}"/>
+              </a:ext>
+            </a:extLst>
+          </p:cNvPr>
+          <p:cNvCxnSpPr>
+            <a:cxnSpLocks/>
+            <a:endCxn id="3" idx="2"/>
+          </p:cNvCxnSpPr>
+          <p:nvPr/>
+        </p:nvCxnSpPr>
+        <p:spPr>
+          <a:xfrm flipV="1">
+            <a:off x="3222171" y="1234032"/>
+            <a:ext cx="1123621" cy="11686"/>
+          </a:xfrm>
+          <a:prstGeom prst="straightConnector1">
+            <a:avLst/>
+          </a:prstGeom>
+          <a:ln w="63500">
+            <a:tailEnd type="triangle"/>
+          </a:ln>
+        </p:spPr>
+        <p:style>
+          <a:lnRef idx="1">
+            <a:schemeClr val="accent1"/>
+          </a:lnRef>
+          <a:fillRef idx="0">
+            <a:schemeClr val="accent1"/>
+          </a:fillRef>
+          <a:effectRef idx="0">
+            <a:schemeClr val="accent1"/>
+          </a:effectRef>
+          <a:fontRef idx="minor">
+            <a:schemeClr val="tx1"/>
+          </a:fontRef>
+        </p:style>
+      </p:cxnSp>
+      <p:cxnSp>
+        <p:nvCxnSpPr>
+          <p:cNvPr id="32" name="Straight Connector 31">
+            <a:extLst>
+              <a:ext uri="{FF2B5EF4-FFF2-40B4-BE49-F238E27FC236}">
+                <a16:creationId xmlns:a16="http://schemas.microsoft.com/office/drawing/2014/main" id="{B2DFF184-BBF6-4852-B9CA-8AAB8E631B72}"/>
+              </a:ext>
+            </a:extLst>
+          </p:cNvPr>
+          <p:cNvCxnSpPr>
+            <a:cxnSpLocks/>
+          </p:cNvCxnSpPr>
+          <p:nvPr/>
+        </p:nvCxnSpPr>
+        <p:spPr>
+          <a:xfrm>
+            <a:off x="3267062" y="1234031"/>
+            <a:ext cx="0" cy="1918714"/>
+          </a:xfrm>
+          <a:prstGeom prst="line">
+            <a:avLst/>
+          </a:prstGeom>
+          <a:ln w="63500"/>
+        </p:spPr>
+        <p:style>
+          <a:lnRef idx="1">
+            <a:schemeClr val="accent1"/>
+          </a:lnRef>
+          <a:fillRef idx="0">
+            <a:schemeClr val="accent1"/>
+          </a:fillRef>
+          <a:effectRef idx="0">
+            <a:schemeClr val="accent1"/>
+          </a:effectRef>
+          <a:fontRef idx="minor">
+            <a:schemeClr val="tx1"/>
+          </a:fontRef>
+        </p:style>
+      </p:cxnSp>
+      <p:cxnSp>
+        <p:nvCxnSpPr>
+          <p:cNvPr id="34" name="Straight Connector 33">
+            <a:extLst>
+              <a:ext uri="{FF2B5EF4-FFF2-40B4-BE49-F238E27FC236}">
+                <a16:creationId xmlns:a16="http://schemas.microsoft.com/office/drawing/2014/main" id="{9F0B9179-10D3-40B9-84F3-AA6FFE72F86F}"/>
+              </a:ext>
+            </a:extLst>
+          </p:cNvPr>
+          <p:cNvCxnSpPr>
+            <a:cxnSpLocks/>
+            <a:stCxn id="4" idx="2"/>
+          </p:cNvCxnSpPr>
+          <p:nvPr/>
+        </p:nvCxnSpPr>
+        <p:spPr>
+          <a:xfrm flipH="1" flipV="1">
+            <a:off x="3267062" y="3146902"/>
+            <a:ext cx="1103948" cy="17530"/>
+          </a:xfrm>
+          <a:prstGeom prst="line">
+            <a:avLst/>
+          </a:prstGeom>
+          <a:ln w="63500"/>
+        </p:spPr>
+        <p:style>
+          <a:lnRef idx="1">
+            <a:schemeClr val="accent1"/>
+          </a:lnRef>
+          <a:fillRef idx="0">
+            <a:schemeClr val="accent1"/>
+          </a:fillRef>
+          <a:effectRef idx="0">
+            <a:schemeClr val="accent1"/>
+          </a:effectRef>
+          <a:fontRef idx="minor">
+            <a:schemeClr val="tx1"/>
+          </a:fontRef>
+        </p:style>
+      </p:cxnSp>
+      <p:cxnSp>
+        <p:nvCxnSpPr>
+          <p:cNvPr id="38" name="Straight Arrow Connector 37">
+            <a:extLst>
+              <a:ext uri="{FF2B5EF4-FFF2-40B4-BE49-F238E27FC236}">
+                <a16:creationId xmlns:a16="http://schemas.microsoft.com/office/drawing/2014/main" id="{08CCDD38-2445-40C2-A841-9395A0708FCC}"/>
+              </a:ext>
+            </a:extLst>
+          </p:cNvPr>
+          <p:cNvCxnSpPr>
+            <a:cxnSpLocks/>
+            <a:stCxn id="3" idx="4"/>
+            <a:endCxn id="4" idx="0"/>
+          </p:cNvCxnSpPr>
+          <p:nvPr/>
+        </p:nvCxnSpPr>
+        <p:spPr>
+          <a:xfrm>
+            <a:off x="4885157" y="1728985"/>
+            <a:ext cx="25218" cy="940493"/>
+          </a:xfrm>
+          <a:prstGeom prst="straightConnector1">
+            <a:avLst/>
+          </a:prstGeom>
+          <a:ln w="63500">
+            <a:tailEnd type="triangle"/>
+          </a:ln>
+        </p:spPr>
+        <p:style>
+          <a:lnRef idx="1">
+            <a:schemeClr val="accent1"/>
+          </a:lnRef>
+          <a:fillRef idx="0">
+            <a:schemeClr val="accent1"/>
+          </a:fillRef>
+          <a:effectRef idx="0">
+            <a:schemeClr val="accent1"/>
+          </a:effectRef>
+          <a:fontRef idx="minor">
+            <a:schemeClr val="tx1"/>
+          </a:fontRef>
+        </p:style>
+      </p:cxnSp>
+      <p:cxnSp>
+        <p:nvCxnSpPr>
+          <p:cNvPr id="43" name="Straight Arrow Connector 42">
+            <a:extLst>
+              <a:ext uri="{FF2B5EF4-FFF2-40B4-BE49-F238E27FC236}">
+                <a16:creationId xmlns:a16="http://schemas.microsoft.com/office/drawing/2014/main" id="{9929610B-F4EC-4A9A-AF2C-E8CBD2513D54}"/>
+              </a:ext>
+            </a:extLst>
+          </p:cNvPr>
+          <p:cNvCxnSpPr>
+            <a:cxnSpLocks/>
+            <a:stCxn id="4" idx="6"/>
+            <a:endCxn id="2" idx="2"/>
+          </p:cNvCxnSpPr>
+          <p:nvPr/>
+        </p:nvCxnSpPr>
+        <p:spPr>
+          <a:xfrm>
+            <a:off x="5449740" y="3164432"/>
+            <a:ext cx="934402" cy="0"/>
+          </a:xfrm>
+          <a:prstGeom prst="straightConnector1">
+            <a:avLst/>
+          </a:prstGeom>
+          <a:ln w="63500">
+            <a:tailEnd type="triangle"/>
+          </a:ln>
+        </p:spPr>
+        <p:style>
+          <a:lnRef idx="1">
+            <a:schemeClr val="accent1"/>
+          </a:lnRef>
+          <a:fillRef idx="0">
+            <a:schemeClr val="accent1"/>
+          </a:fillRef>
+          <a:effectRef idx="0">
+            <a:schemeClr val="accent1"/>
+          </a:effectRef>
+          <a:fontRef idx="minor">
+            <a:schemeClr val="tx1"/>
+          </a:fontRef>
+        </p:style>
+      </p:cxnSp>
+      <p:cxnSp>
+        <p:nvCxnSpPr>
+          <p:cNvPr id="46" name="Straight Arrow Connector 45">
+            <a:extLst>
+              <a:ext uri="{FF2B5EF4-FFF2-40B4-BE49-F238E27FC236}">
+                <a16:creationId xmlns:a16="http://schemas.microsoft.com/office/drawing/2014/main" id="{4DBCE2D8-8704-4966-8DE8-1C4A23B8472C}"/>
+              </a:ext>
+            </a:extLst>
+          </p:cNvPr>
+          <p:cNvCxnSpPr>
+            <a:cxnSpLocks/>
+            <a:stCxn id="2" idx="6"/>
+            <a:endCxn id="5" idx="2"/>
+          </p:cNvCxnSpPr>
+          <p:nvPr/>
+        </p:nvCxnSpPr>
+        <p:spPr>
+          <a:xfrm flipV="1">
+            <a:off x="7462872" y="3164431"/>
+            <a:ext cx="1181870" cy="1"/>
+          </a:xfrm>
+          <a:prstGeom prst="straightConnector1">
+            <a:avLst/>
+          </a:prstGeom>
+          <a:ln w="63500">
+            <a:tailEnd type="triangle"/>
+          </a:ln>
+        </p:spPr>
+        <p:style>
+          <a:lnRef idx="1">
+            <a:schemeClr val="accent1"/>
+          </a:lnRef>
+          <a:fillRef idx="0">
+            <a:schemeClr val="accent1"/>
+          </a:fillRef>
+          <a:effectRef idx="0">
+            <a:schemeClr val="accent1"/>
+          </a:effectRef>
+          <a:fontRef idx="minor">
+            <a:schemeClr val="tx1"/>
+          </a:fontRef>
+        </p:style>
+      </p:cxnSp>
+      <p:cxnSp>
+        <p:nvCxnSpPr>
+          <p:cNvPr id="49" name="Straight Arrow Connector 48">
+            <a:extLst>
+              <a:ext uri="{FF2B5EF4-FFF2-40B4-BE49-F238E27FC236}">
+                <a16:creationId xmlns:a16="http://schemas.microsoft.com/office/drawing/2014/main" id="{A430F2C2-59E0-47DE-BF2D-5CD6A2A029E1}"/>
+              </a:ext>
+            </a:extLst>
+          </p:cNvPr>
+          <p:cNvCxnSpPr>
+            <a:cxnSpLocks/>
+            <a:stCxn id="4" idx="4"/>
+          </p:cNvCxnSpPr>
+          <p:nvPr/>
+        </p:nvCxnSpPr>
+        <p:spPr>
+          <a:xfrm>
+            <a:off x="4910375" y="3659385"/>
+            <a:ext cx="0" cy="529138"/>
+          </a:xfrm>
+          <a:prstGeom prst="straightConnector1">
+            <a:avLst/>
+          </a:prstGeom>
+          <a:ln w="63500">
+            <a:tailEnd type="triangle"/>
+          </a:ln>
+        </p:spPr>
+        <p:style>
+          <a:lnRef idx="1">
+            <a:schemeClr val="accent1"/>
+          </a:lnRef>
+          <a:fillRef idx="0">
+            <a:schemeClr val="accent1"/>
+          </a:fillRef>
+          <a:effectRef idx="0">
+            <a:schemeClr val="accent1"/>
+          </a:effectRef>
+          <a:fontRef idx="minor">
+            <a:schemeClr val="tx1"/>
+          </a:fontRef>
+        </p:style>
+      </p:cxnSp>
+      <p:sp>
+        <p:nvSpPr>
+          <p:cNvPr id="53" name="TextBox 52">
+            <a:extLst>
+              <a:ext uri="{FF2B5EF4-FFF2-40B4-BE49-F238E27FC236}">
+                <a16:creationId xmlns:a16="http://schemas.microsoft.com/office/drawing/2014/main" id="{EB3A75C0-8128-4C86-9859-30E913859612}"/>
+              </a:ext>
+            </a:extLst>
+          </p:cNvPr>
+          <p:cNvSpPr txBox="1"/>
+          <p:nvPr/>
+        </p:nvSpPr>
+        <p:spPr>
+          <a:xfrm>
+            <a:off x="4545678" y="4199768"/>
+            <a:ext cx="729393" cy="400110"/>
+          </a:xfrm>
+          <a:prstGeom prst="rect">
+            <a:avLst/>
+          </a:prstGeom>
+          <a:noFill/>
+        </p:spPr>
+        <p:txBody>
+          <a:bodyPr wrap="square" rtlCol="0">
+            <a:spAutoFit/>
+          </a:bodyPr>
+          <a:lstStyle/>
+          <a:p>
+            <a:r>
+              <a:rPr lang="en-US" sz="2000" b="1" dirty="0"/>
+              <a:t>OUT</a:t>
+            </a:r>
+          </a:p>
+        </p:txBody>
+      </p:sp>
+    </p:spTree>
+    <p:extLst>
+      <p:ext uri="{BB962C8B-B14F-4D97-AF65-F5344CB8AC3E}">
+        <p14:creationId xmlns:p14="http://schemas.microsoft.com/office/powerpoint/2010/main" val="3020142892"/>
+      </p:ext>
+    </p:extLst>
+  </p:cSld>
+  <p:clrMapOvr>
+    <a:masterClrMapping/>
+  </p:clrMapOvr>
+</p:sld>
+</file>
+
+<file path=ppt/slides/slide12.xml><?xml version="1.0" encoding="utf-8"?>
+<p:sld xmlns:a="http://schemas.openxmlformats.org/drawingml/2006/main" xmlns:r="http://schemas.openxmlformats.org/officeDocument/2006/relationships" xmlns:p="http://schemas.openxmlformats.org/presentationml/2006/main">
+  <p:cSld>
+    <p:spTree>
+      <p:nvGrpSpPr>
+        <p:cNvPr id="1" name=""/>
+        <p:cNvGrpSpPr/>
+        <p:nvPr/>
+      </p:nvGrpSpPr>
+      <p:grpSpPr>
+        <a:xfrm>
+          <a:off x="0" y="0"/>
+          <a:ext cx="0" cy="0"/>
+          <a:chOff x="0" y="0"/>
+          <a:chExt cx="0" cy="0"/>
+        </a:xfrm>
+      </p:grpSpPr>
+      <p:sp>
+        <p:nvSpPr>
+          <p:cNvPr id="2" name="Oval 1">
+            <a:extLst>
+              <a:ext uri="{FF2B5EF4-FFF2-40B4-BE49-F238E27FC236}">
+                <a16:creationId xmlns:a16="http://schemas.microsoft.com/office/drawing/2014/main" id="{FDE72F3A-E1B3-4065-97F2-A3B8AEC3E42B}"/>
+              </a:ext>
+            </a:extLst>
+          </p:cNvPr>
+          <p:cNvSpPr/>
+          <p:nvPr/>
+        </p:nvSpPr>
+        <p:spPr>
+          <a:xfrm>
+            <a:off x="1207985" y="1580907"/>
+            <a:ext cx="1078730" cy="989907"/>
+          </a:xfrm>
+          <a:prstGeom prst="ellipse">
+            <a:avLst/>
+          </a:prstGeom>
+          <a:noFill/>
+          <a:ln w="25400"/>
+        </p:spPr>
+        <p:style>
+          <a:lnRef idx="2">
+            <a:schemeClr val="accent1">
+              <a:shade val="50000"/>
+            </a:schemeClr>
+          </a:lnRef>
+          <a:fillRef idx="1">
+            <a:schemeClr val="accent1"/>
+          </a:fillRef>
+          <a:effectRef idx="0">
+            <a:schemeClr val="accent1"/>
+          </a:effectRef>
+          <a:fontRef idx="minor">
+            <a:schemeClr val="lt1"/>
+          </a:fontRef>
+        </p:style>
+        <p:txBody>
+          <a:bodyPr rtlCol="0" anchor="ctr"/>
+          <a:lstStyle/>
+          <a:p>
+            <a:pPr algn="ctr"/>
+            <a:r>
+              <a:rPr lang="en-US" sz="2800" b="1" dirty="0">
+                <a:solidFill>
+                  <a:schemeClr val="tx1"/>
+                </a:solidFill>
+              </a:rPr>
+              <a:t>X</a:t>
+            </a:r>
+          </a:p>
+        </p:txBody>
+      </p:sp>
+      <p:sp>
+        <p:nvSpPr>
+          <p:cNvPr id="3" name="Oval 2">
+            <a:extLst>
+              <a:ext uri="{FF2B5EF4-FFF2-40B4-BE49-F238E27FC236}">
+                <a16:creationId xmlns:a16="http://schemas.microsoft.com/office/drawing/2014/main" id="{B6A3E0F6-A888-4EED-A62F-31DEF0C98FB2}"/>
+              </a:ext>
+            </a:extLst>
+          </p:cNvPr>
+          <p:cNvSpPr/>
+          <p:nvPr/>
+        </p:nvSpPr>
+        <p:spPr>
+          <a:xfrm>
+            <a:off x="1207985" y="2934046"/>
+            <a:ext cx="1078730" cy="989907"/>
+          </a:xfrm>
+          <a:prstGeom prst="ellipse">
+            <a:avLst/>
+          </a:prstGeom>
+          <a:noFill/>
+          <a:ln w="25400"/>
+        </p:spPr>
+        <p:style>
+          <a:lnRef idx="2">
+            <a:schemeClr val="accent1">
+              <a:shade val="50000"/>
+            </a:schemeClr>
+          </a:lnRef>
+          <a:fillRef idx="1">
+            <a:schemeClr val="accent1"/>
+          </a:fillRef>
+          <a:effectRef idx="0">
+            <a:schemeClr val="accent1"/>
+          </a:effectRef>
+          <a:fontRef idx="minor">
+            <a:schemeClr val="lt1"/>
+          </a:fontRef>
+        </p:style>
+        <p:txBody>
+          <a:bodyPr rtlCol="0" anchor="ctr"/>
+          <a:lstStyle/>
+          <a:p>
+            <a:pPr algn="ctr"/>
+            <a:r>
+              <a:rPr lang="en-US" sz="2800" b="1" dirty="0">
+                <a:solidFill>
+                  <a:schemeClr val="tx1"/>
+                </a:solidFill>
+              </a:rPr>
+              <a:t>X</a:t>
+            </a:r>
+          </a:p>
+        </p:txBody>
+      </p:sp>
+      <p:sp>
+        <p:nvSpPr>
+          <p:cNvPr id="4" name="Oval 3">
+            <a:extLst>
+              <a:ext uri="{FF2B5EF4-FFF2-40B4-BE49-F238E27FC236}">
+                <a16:creationId xmlns:a16="http://schemas.microsoft.com/office/drawing/2014/main" id="{F0E08D9B-0350-4C2D-9603-88794B672E43}"/>
+              </a:ext>
+            </a:extLst>
+          </p:cNvPr>
+          <p:cNvSpPr/>
+          <p:nvPr/>
+        </p:nvSpPr>
+        <p:spPr>
+          <a:xfrm>
+            <a:off x="1207985" y="4287185"/>
+            <a:ext cx="1078730" cy="989907"/>
+          </a:xfrm>
+          <a:prstGeom prst="ellipse">
+            <a:avLst/>
+          </a:prstGeom>
+          <a:noFill/>
+          <a:ln w="25400"/>
+        </p:spPr>
+        <p:style>
+          <a:lnRef idx="2">
+            <a:schemeClr val="accent1">
+              <a:shade val="50000"/>
+            </a:schemeClr>
+          </a:lnRef>
+          <a:fillRef idx="1">
+            <a:schemeClr val="accent1"/>
+          </a:fillRef>
+          <a:effectRef idx="0">
+            <a:schemeClr val="accent1"/>
+          </a:effectRef>
+          <a:fontRef idx="minor">
+            <a:schemeClr val="lt1"/>
+          </a:fontRef>
+        </p:style>
+        <p:txBody>
+          <a:bodyPr rtlCol="0" anchor="ctr"/>
+          <a:lstStyle/>
+          <a:p>
+            <a:pPr algn="ctr"/>
+            <a:r>
+              <a:rPr lang="en-US" sz="2800" b="1" dirty="0">
+                <a:solidFill>
+                  <a:schemeClr val="tx1"/>
+                </a:solidFill>
+              </a:rPr>
+              <a:t>X</a:t>
+            </a:r>
+          </a:p>
+        </p:txBody>
+      </p:sp>
+      <p:sp>
+        <p:nvSpPr>
+          <p:cNvPr id="5" name="TextBox 4">
+            <a:extLst>
+              <a:ext uri="{FF2B5EF4-FFF2-40B4-BE49-F238E27FC236}">
+                <a16:creationId xmlns:a16="http://schemas.microsoft.com/office/drawing/2014/main" id="{43D820D5-24FE-408A-AEC4-F0F7E0A9D479}"/>
+              </a:ext>
+            </a:extLst>
+          </p:cNvPr>
+          <p:cNvSpPr txBox="1"/>
+          <p:nvPr/>
+        </p:nvSpPr>
+        <p:spPr>
+          <a:xfrm>
+            <a:off x="3946965" y="6005936"/>
+            <a:ext cx="3172293" cy="400110"/>
+          </a:xfrm>
+          <a:prstGeom prst="rect">
+            <a:avLst/>
+          </a:prstGeom>
+          <a:noFill/>
+        </p:spPr>
+        <p:txBody>
+          <a:bodyPr wrap="square" rtlCol="0">
+            <a:spAutoFit/>
+          </a:bodyPr>
+          <a:lstStyle/>
+          <a:p>
+            <a:pPr algn="ctr"/>
+            <a:r>
+              <a:rPr lang="en-US" sz="2000" b="1" dirty="0"/>
+              <a:t>Input Sequence</a:t>
+            </a:r>
+          </a:p>
+        </p:txBody>
+      </p:sp>
+      <p:sp>
+        <p:nvSpPr>
+          <p:cNvPr id="6" name="TextBox 5">
+            <a:extLst>
+              <a:ext uri="{FF2B5EF4-FFF2-40B4-BE49-F238E27FC236}">
+                <a16:creationId xmlns:a16="http://schemas.microsoft.com/office/drawing/2014/main" id="{3F425AFC-B26E-4BF0-AF65-3E1189C8E2AF}"/>
+              </a:ext>
+            </a:extLst>
+          </p:cNvPr>
+          <p:cNvSpPr txBox="1"/>
+          <p:nvPr/>
+        </p:nvSpPr>
+        <p:spPr>
+          <a:xfrm rot="16200000">
+            <a:off x="-750221" y="3280228"/>
+            <a:ext cx="3172293" cy="400110"/>
+          </a:xfrm>
+          <a:prstGeom prst="rect">
+            <a:avLst/>
+          </a:prstGeom>
+          <a:noFill/>
+        </p:spPr>
+        <p:txBody>
+          <a:bodyPr wrap="square" rtlCol="0">
+            <a:spAutoFit/>
+          </a:bodyPr>
+          <a:lstStyle/>
+          <a:p>
+            <a:pPr algn="ctr"/>
+            <a:r>
+              <a:rPr lang="en-US" sz="2000" b="1" dirty="0"/>
+              <a:t>Intermediate Sequences</a:t>
+            </a:r>
+          </a:p>
+        </p:txBody>
+      </p:sp>
+      <p:sp>
+        <p:nvSpPr>
+          <p:cNvPr id="7" name="Rectangle 6">
+            <a:extLst>
+              <a:ext uri="{FF2B5EF4-FFF2-40B4-BE49-F238E27FC236}">
+                <a16:creationId xmlns:a16="http://schemas.microsoft.com/office/drawing/2014/main" id="{4F9D8D73-DE66-4745-852D-5874B9FA4B3C}"/>
+              </a:ext>
+            </a:extLst>
+          </p:cNvPr>
+          <p:cNvSpPr/>
+          <p:nvPr/>
+        </p:nvSpPr>
+        <p:spPr>
+          <a:xfrm>
+            <a:off x="2920538" y="4950520"/>
+            <a:ext cx="5225143" cy="653143"/>
+          </a:xfrm>
+          <a:prstGeom prst="rect">
+            <a:avLst/>
+          </a:prstGeom>
+          <a:noFill/>
+          <a:ln w="25400"/>
+        </p:spPr>
+        <p:style>
+          <a:lnRef idx="2">
+            <a:schemeClr val="accent1">
+              <a:shade val="50000"/>
+            </a:schemeClr>
+          </a:lnRef>
+          <a:fillRef idx="1">
+            <a:schemeClr val="accent1"/>
+          </a:fillRef>
+          <a:effectRef idx="0">
+            <a:schemeClr val="accent1"/>
+          </a:effectRef>
+          <a:fontRef idx="minor">
+            <a:schemeClr val="lt1"/>
+          </a:fontRef>
+        </p:style>
+        <p:txBody>
+          <a:bodyPr rtlCol="0" anchor="ctr"/>
+          <a:lstStyle/>
+          <a:p>
+            <a:pPr algn="ctr"/>
+            <a:r>
+              <a:rPr lang="en-US" sz="2400" dirty="0">
+                <a:solidFill>
+                  <a:schemeClr val="tx1"/>
+                </a:solidFill>
+              </a:rPr>
+              <a:t>Sequence of words from utterance</a:t>
+            </a:r>
+          </a:p>
+        </p:txBody>
+      </p:sp>
+      <p:sp>
+        <p:nvSpPr>
+          <p:cNvPr id="8" name="Rectangle 7">
+            <a:extLst>
+              <a:ext uri="{FF2B5EF4-FFF2-40B4-BE49-F238E27FC236}">
+                <a16:creationId xmlns:a16="http://schemas.microsoft.com/office/drawing/2014/main" id="{ED137846-ECBB-4BAE-9BFB-6EBE0F90728B}"/>
+              </a:ext>
+            </a:extLst>
+          </p:cNvPr>
+          <p:cNvSpPr/>
+          <p:nvPr/>
+        </p:nvSpPr>
+        <p:spPr>
+          <a:xfrm>
+            <a:off x="3009898" y="3745864"/>
+            <a:ext cx="5225143" cy="653143"/>
+          </a:xfrm>
+          <a:prstGeom prst="rect">
+            <a:avLst/>
+          </a:prstGeom>
+          <a:noFill/>
+          <a:ln w="25400"/>
+        </p:spPr>
+        <p:style>
+          <a:lnRef idx="2">
+            <a:schemeClr val="accent1">
+              <a:shade val="50000"/>
+            </a:schemeClr>
+          </a:lnRef>
+          <a:fillRef idx="1">
+            <a:schemeClr val="accent1"/>
+          </a:fillRef>
+          <a:effectRef idx="0">
+            <a:schemeClr val="accent1"/>
+          </a:effectRef>
+          <a:fontRef idx="minor">
+            <a:schemeClr val="lt1"/>
+          </a:fontRef>
+        </p:style>
+        <p:txBody>
+          <a:bodyPr rtlCol="0" anchor="ctr"/>
+          <a:lstStyle/>
+          <a:p>
+            <a:pPr algn="ctr"/>
+            <a:r>
+              <a:rPr lang="en-US" sz="2400" dirty="0">
+                <a:solidFill>
+                  <a:schemeClr val="tx1"/>
+                </a:solidFill>
+              </a:rPr>
+              <a:t>NLP Analysis</a:t>
+            </a:r>
+          </a:p>
+        </p:txBody>
+      </p:sp>
+      <p:sp>
+        <p:nvSpPr>
+          <p:cNvPr id="9" name="Rectangle 8">
+            <a:extLst>
+              <a:ext uri="{FF2B5EF4-FFF2-40B4-BE49-F238E27FC236}">
+                <a16:creationId xmlns:a16="http://schemas.microsoft.com/office/drawing/2014/main" id="{06B7E848-351D-41C0-95DE-1775914C1DA1}"/>
+              </a:ext>
+            </a:extLst>
+          </p:cNvPr>
+          <p:cNvSpPr/>
+          <p:nvPr/>
+        </p:nvSpPr>
+        <p:spPr>
+          <a:xfrm>
+            <a:off x="3009897" y="2410008"/>
+            <a:ext cx="5225143" cy="653143"/>
+          </a:xfrm>
+          <a:prstGeom prst="rect">
+            <a:avLst/>
+          </a:prstGeom>
+          <a:noFill/>
+          <a:ln w="25400"/>
+        </p:spPr>
+        <p:style>
+          <a:lnRef idx="2">
+            <a:schemeClr val="accent1">
+              <a:shade val="50000"/>
+            </a:schemeClr>
+          </a:lnRef>
+          <a:fillRef idx="1">
+            <a:schemeClr val="accent1"/>
+          </a:fillRef>
+          <a:effectRef idx="0">
+            <a:schemeClr val="accent1"/>
+          </a:effectRef>
+          <a:fontRef idx="minor">
+            <a:schemeClr val="lt1"/>
+          </a:fontRef>
+        </p:style>
+        <p:txBody>
+          <a:bodyPr rtlCol="0" anchor="ctr"/>
+          <a:lstStyle/>
+          <a:p>
+            <a:pPr algn="ctr"/>
+            <a:r>
+              <a:rPr lang="en-US" sz="2400" dirty="0">
+                <a:solidFill>
+                  <a:schemeClr val="tx1"/>
+                </a:solidFill>
+              </a:rPr>
+              <a:t>Sequence or Words</a:t>
+            </a:r>
+          </a:p>
+        </p:txBody>
+      </p:sp>
+      <p:sp>
+        <p:nvSpPr>
+          <p:cNvPr id="10" name="Rectangle 9">
+            <a:extLst>
+              <a:ext uri="{FF2B5EF4-FFF2-40B4-BE49-F238E27FC236}">
+                <a16:creationId xmlns:a16="http://schemas.microsoft.com/office/drawing/2014/main" id="{69F9876D-843C-4A12-8BE0-305CE4576D90}"/>
+              </a:ext>
+            </a:extLst>
+          </p:cNvPr>
+          <p:cNvSpPr/>
+          <p:nvPr/>
+        </p:nvSpPr>
+        <p:spPr>
+          <a:xfrm>
+            <a:off x="3009897" y="1154537"/>
+            <a:ext cx="5225143" cy="653143"/>
+          </a:xfrm>
+          <a:prstGeom prst="rect">
+            <a:avLst/>
+          </a:prstGeom>
+          <a:noFill/>
+          <a:ln w="25400"/>
+        </p:spPr>
+        <p:style>
+          <a:lnRef idx="2">
+            <a:schemeClr val="accent1">
+              <a:shade val="50000"/>
+            </a:schemeClr>
+          </a:lnRef>
+          <a:fillRef idx="1">
+            <a:schemeClr val="accent1"/>
+          </a:fillRef>
+          <a:effectRef idx="0">
+            <a:schemeClr val="accent1"/>
+          </a:effectRef>
+          <a:fontRef idx="minor">
+            <a:schemeClr val="lt1"/>
+          </a:fontRef>
+        </p:style>
+        <p:txBody>
+          <a:bodyPr rtlCol="0" anchor="ctr"/>
+          <a:lstStyle/>
+          <a:p>
+            <a:pPr algn="ctr"/>
+            <a:r>
+              <a:rPr lang="en-US" sz="2400" dirty="0">
+                <a:solidFill>
+                  <a:schemeClr val="tx1"/>
+                </a:solidFill>
+              </a:rPr>
+              <a:t>Utterances</a:t>
+            </a:r>
+          </a:p>
+        </p:txBody>
+      </p:sp>
+      <p:sp>
+        <p:nvSpPr>
+          <p:cNvPr id="11" name="TextBox 10">
+            <a:extLst>
+              <a:ext uri="{FF2B5EF4-FFF2-40B4-BE49-F238E27FC236}">
+                <a16:creationId xmlns:a16="http://schemas.microsoft.com/office/drawing/2014/main" id="{E3530FE7-220B-4F8D-9320-A766B903679F}"/>
+              </a:ext>
+            </a:extLst>
+          </p:cNvPr>
+          <p:cNvSpPr txBox="1"/>
+          <p:nvPr/>
+        </p:nvSpPr>
+        <p:spPr>
+          <a:xfrm>
+            <a:off x="4036321" y="322584"/>
+            <a:ext cx="3172293" cy="400110"/>
+          </a:xfrm>
+          <a:prstGeom prst="rect">
+            <a:avLst/>
+          </a:prstGeom>
+          <a:noFill/>
+        </p:spPr>
+        <p:txBody>
+          <a:bodyPr wrap="square" rtlCol="0">
+            <a:spAutoFit/>
+          </a:bodyPr>
+          <a:lstStyle/>
+          <a:p>
+            <a:pPr algn="ctr"/>
+            <a:r>
+              <a:rPr lang="en-US" sz="2000" b="1" dirty="0"/>
+              <a:t>Output Sequence</a:t>
+            </a:r>
+          </a:p>
+        </p:txBody>
+      </p:sp>
+      <p:cxnSp>
+        <p:nvCxnSpPr>
+          <p:cNvPr id="12" name="Straight Arrow Connector 11">
+            <a:extLst>
+              <a:ext uri="{FF2B5EF4-FFF2-40B4-BE49-F238E27FC236}">
+                <a16:creationId xmlns:a16="http://schemas.microsoft.com/office/drawing/2014/main" id="{EC924AB4-203E-4E0D-A735-9A0125496372}"/>
+              </a:ext>
+            </a:extLst>
+          </p:cNvPr>
+          <p:cNvCxnSpPr>
+            <a:cxnSpLocks/>
+            <a:stCxn id="5" idx="0"/>
+            <a:endCxn id="7" idx="2"/>
+          </p:cNvCxnSpPr>
+          <p:nvPr/>
+        </p:nvCxnSpPr>
+        <p:spPr>
+          <a:xfrm flipH="1" flipV="1">
+            <a:off x="5533110" y="5603663"/>
+            <a:ext cx="2" cy="402273"/>
+          </a:xfrm>
+          <a:prstGeom prst="straightConnector1">
+            <a:avLst/>
+          </a:prstGeom>
+          <a:ln w="63500">
+            <a:tailEnd type="triangle"/>
+          </a:ln>
+        </p:spPr>
+        <p:style>
+          <a:lnRef idx="1">
+            <a:schemeClr val="accent1"/>
+          </a:lnRef>
+          <a:fillRef idx="0">
+            <a:schemeClr val="accent1"/>
+          </a:fillRef>
+          <a:effectRef idx="0">
+            <a:schemeClr val="accent1"/>
+          </a:effectRef>
+          <a:fontRef idx="minor">
+            <a:schemeClr val="tx1"/>
+          </a:fontRef>
+        </p:style>
+      </p:cxnSp>
+      <p:cxnSp>
+        <p:nvCxnSpPr>
+          <p:cNvPr id="17" name="Straight Arrow Connector 16">
+            <a:extLst>
+              <a:ext uri="{FF2B5EF4-FFF2-40B4-BE49-F238E27FC236}">
+                <a16:creationId xmlns:a16="http://schemas.microsoft.com/office/drawing/2014/main" id="{739AAB05-9DDF-4F5F-BD5C-18C060FD27E0}"/>
+              </a:ext>
+            </a:extLst>
+          </p:cNvPr>
+          <p:cNvCxnSpPr>
+            <a:cxnSpLocks/>
+            <a:stCxn id="10" idx="0"/>
+          </p:cNvCxnSpPr>
+          <p:nvPr/>
+        </p:nvCxnSpPr>
+        <p:spPr>
+          <a:xfrm flipV="1">
+            <a:off x="5622469" y="747581"/>
+            <a:ext cx="0" cy="406956"/>
+          </a:xfrm>
+          <a:prstGeom prst="straightConnector1">
+            <a:avLst/>
+          </a:prstGeom>
+          <a:ln w="63500">
+            <a:tailEnd type="triangle"/>
+          </a:ln>
+        </p:spPr>
+        <p:style>
+          <a:lnRef idx="1">
+            <a:schemeClr val="accent1"/>
+          </a:lnRef>
+          <a:fillRef idx="0">
+            <a:schemeClr val="accent1"/>
+          </a:fillRef>
+          <a:effectRef idx="0">
+            <a:schemeClr val="accent1"/>
+          </a:effectRef>
+          <a:fontRef idx="minor">
+            <a:schemeClr val="tx1"/>
+          </a:fontRef>
+        </p:style>
+      </p:cxnSp>
+      <p:cxnSp>
+        <p:nvCxnSpPr>
+          <p:cNvPr id="20" name="Straight Arrow Connector 19">
+            <a:extLst>
+              <a:ext uri="{FF2B5EF4-FFF2-40B4-BE49-F238E27FC236}">
+                <a16:creationId xmlns:a16="http://schemas.microsoft.com/office/drawing/2014/main" id="{8BF12E31-D3AA-4193-BAB7-0BE27DF7AA21}"/>
+              </a:ext>
+            </a:extLst>
+          </p:cNvPr>
+          <p:cNvCxnSpPr>
+            <a:cxnSpLocks/>
+            <a:stCxn id="7" idx="1"/>
+            <a:endCxn id="4" idx="5"/>
+          </p:cNvCxnSpPr>
+          <p:nvPr/>
+        </p:nvCxnSpPr>
+        <p:spPr>
+          <a:xfrm flipH="1" flipV="1">
+            <a:off x="2128739" y="5132123"/>
+            <a:ext cx="791799" cy="144969"/>
+          </a:xfrm>
+          <a:prstGeom prst="straightConnector1">
+            <a:avLst/>
+          </a:prstGeom>
+          <a:ln w="63500">
+            <a:tailEnd type="triangle"/>
+          </a:ln>
+        </p:spPr>
+        <p:style>
+          <a:lnRef idx="1">
+            <a:schemeClr val="accent1"/>
+          </a:lnRef>
+          <a:fillRef idx="0">
+            <a:schemeClr val="accent1"/>
+          </a:fillRef>
+          <a:effectRef idx="0">
+            <a:schemeClr val="accent1"/>
+          </a:effectRef>
+          <a:fontRef idx="minor">
+            <a:schemeClr val="tx1"/>
+          </a:fontRef>
+        </p:style>
+      </p:cxnSp>
+      <p:cxnSp>
+        <p:nvCxnSpPr>
+          <p:cNvPr id="23" name="Straight Arrow Connector 22">
+            <a:extLst>
+              <a:ext uri="{FF2B5EF4-FFF2-40B4-BE49-F238E27FC236}">
+                <a16:creationId xmlns:a16="http://schemas.microsoft.com/office/drawing/2014/main" id="{806BB721-51DB-482D-B05A-9F570987F2F9}"/>
+              </a:ext>
+            </a:extLst>
+          </p:cNvPr>
+          <p:cNvCxnSpPr>
+            <a:cxnSpLocks/>
+            <a:stCxn id="4" idx="7"/>
+          </p:cNvCxnSpPr>
+          <p:nvPr/>
+        </p:nvCxnSpPr>
+        <p:spPr>
+          <a:xfrm flipV="1">
+            <a:off x="2128739" y="4287185"/>
+            <a:ext cx="881158" cy="144969"/>
+          </a:xfrm>
+          <a:prstGeom prst="straightConnector1">
+            <a:avLst/>
+          </a:prstGeom>
+          <a:ln w="63500">
+            <a:tailEnd type="triangle"/>
+          </a:ln>
+        </p:spPr>
+        <p:style>
+          <a:lnRef idx="1">
+            <a:schemeClr val="accent1"/>
+          </a:lnRef>
+          <a:fillRef idx="0">
+            <a:schemeClr val="accent1"/>
+          </a:fillRef>
+          <a:effectRef idx="0">
+            <a:schemeClr val="accent1"/>
+          </a:effectRef>
+          <a:fontRef idx="minor">
+            <a:schemeClr val="tx1"/>
+          </a:fontRef>
+        </p:style>
+      </p:cxnSp>
+      <p:cxnSp>
+        <p:nvCxnSpPr>
+          <p:cNvPr id="26" name="Straight Arrow Connector 25">
+            <a:extLst>
+              <a:ext uri="{FF2B5EF4-FFF2-40B4-BE49-F238E27FC236}">
+                <a16:creationId xmlns:a16="http://schemas.microsoft.com/office/drawing/2014/main" id="{9222A60E-13BA-4016-9C5A-B26810D9D497}"/>
+              </a:ext>
+            </a:extLst>
+          </p:cNvPr>
+          <p:cNvCxnSpPr>
+            <a:cxnSpLocks/>
+            <a:endCxn id="3" idx="5"/>
+          </p:cNvCxnSpPr>
+          <p:nvPr/>
+        </p:nvCxnSpPr>
+        <p:spPr>
+          <a:xfrm flipH="1" flipV="1">
+            <a:off x="2128739" y="3778984"/>
+            <a:ext cx="881158" cy="105928"/>
+          </a:xfrm>
+          <a:prstGeom prst="straightConnector1">
+            <a:avLst/>
+          </a:prstGeom>
+          <a:ln w="63500">
+            <a:tailEnd type="triangle"/>
+          </a:ln>
+        </p:spPr>
+        <p:style>
+          <a:lnRef idx="1">
+            <a:schemeClr val="accent1"/>
+          </a:lnRef>
+          <a:fillRef idx="0">
+            <a:schemeClr val="accent1"/>
+          </a:fillRef>
+          <a:effectRef idx="0">
+            <a:schemeClr val="accent1"/>
+          </a:effectRef>
+          <a:fontRef idx="minor">
+            <a:schemeClr val="tx1"/>
+          </a:fontRef>
+        </p:style>
+      </p:cxnSp>
+      <p:cxnSp>
+        <p:nvCxnSpPr>
+          <p:cNvPr id="29" name="Straight Arrow Connector 28">
+            <a:extLst>
+              <a:ext uri="{FF2B5EF4-FFF2-40B4-BE49-F238E27FC236}">
+                <a16:creationId xmlns:a16="http://schemas.microsoft.com/office/drawing/2014/main" id="{CDDD5C67-E3D0-4BEC-BFD5-58C873335526}"/>
+              </a:ext>
+            </a:extLst>
+          </p:cNvPr>
+          <p:cNvCxnSpPr>
+            <a:cxnSpLocks/>
+            <a:stCxn id="3" idx="7"/>
+          </p:cNvCxnSpPr>
+          <p:nvPr/>
+        </p:nvCxnSpPr>
+        <p:spPr>
+          <a:xfrm flipV="1">
+            <a:off x="2128739" y="2934047"/>
+            <a:ext cx="881158" cy="144968"/>
+          </a:xfrm>
+          <a:prstGeom prst="straightConnector1">
+            <a:avLst/>
+          </a:prstGeom>
+          <a:ln w="63500">
+            <a:tailEnd type="triangle"/>
+          </a:ln>
+        </p:spPr>
+        <p:style>
+          <a:lnRef idx="1">
+            <a:schemeClr val="accent1"/>
+          </a:lnRef>
+          <a:fillRef idx="0">
+            <a:schemeClr val="accent1"/>
+          </a:fillRef>
+          <a:effectRef idx="0">
+            <a:schemeClr val="accent1"/>
+          </a:effectRef>
+          <a:fontRef idx="minor">
+            <a:schemeClr val="tx1"/>
+          </a:fontRef>
+        </p:style>
+      </p:cxnSp>
+      <p:cxnSp>
+        <p:nvCxnSpPr>
+          <p:cNvPr id="32" name="Straight Arrow Connector 31">
+            <a:extLst>
+              <a:ext uri="{FF2B5EF4-FFF2-40B4-BE49-F238E27FC236}">
+                <a16:creationId xmlns:a16="http://schemas.microsoft.com/office/drawing/2014/main" id="{9B3825AA-DBD7-4B12-B785-DC3E9711A376}"/>
+              </a:ext>
+            </a:extLst>
+          </p:cNvPr>
+          <p:cNvCxnSpPr>
+            <a:cxnSpLocks/>
+            <a:endCxn id="2" idx="5"/>
+          </p:cNvCxnSpPr>
+          <p:nvPr/>
+        </p:nvCxnSpPr>
+        <p:spPr>
+          <a:xfrm flipH="1" flipV="1">
+            <a:off x="2128739" y="2425845"/>
+            <a:ext cx="881158" cy="105930"/>
+          </a:xfrm>
+          <a:prstGeom prst="straightConnector1">
+            <a:avLst/>
+          </a:prstGeom>
+          <a:ln w="63500">
+            <a:tailEnd type="triangle"/>
+          </a:ln>
+        </p:spPr>
+        <p:style>
+          <a:lnRef idx="1">
+            <a:schemeClr val="accent1"/>
+          </a:lnRef>
+          <a:fillRef idx="0">
+            <a:schemeClr val="accent1"/>
+          </a:fillRef>
+          <a:effectRef idx="0">
+            <a:schemeClr val="accent1"/>
+          </a:effectRef>
+          <a:fontRef idx="minor">
+            <a:schemeClr val="tx1"/>
+          </a:fontRef>
+        </p:style>
+      </p:cxnSp>
+      <p:cxnSp>
+        <p:nvCxnSpPr>
+          <p:cNvPr id="35" name="Straight Arrow Connector 34">
+            <a:extLst>
+              <a:ext uri="{FF2B5EF4-FFF2-40B4-BE49-F238E27FC236}">
+                <a16:creationId xmlns:a16="http://schemas.microsoft.com/office/drawing/2014/main" id="{74F475C1-5580-41C9-8625-86EC1DF8804B}"/>
+              </a:ext>
+            </a:extLst>
+          </p:cNvPr>
+          <p:cNvCxnSpPr>
+            <a:cxnSpLocks/>
+            <a:stCxn id="2" idx="7"/>
+            <a:endCxn id="10" idx="1"/>
+          </p:cNvCxnSpPr>
+          <p:nvPr/>
+        </p:nvCxnSpPr>
+        <p:spPr>
+          <a:xfrm flipV="1">
+            <a:off x="2128739" y="1481109"/>
+            <a:ext cx="881158" cy="244767"/>
+          </a:xfrm>
+          <a:prstGeom prst="straightConnector1">
+            <a:avLst/>
+          </a:prstGeom>
+          <a:ln w="63500">
+            <a:tailEnd type="triangle"/>
+          </a:ln>
+        </p:spPr>
+        <p:style>
+          <a:lnRef idx="1">
+            <a:schemeClr val="accent1"/>
+          </a:lnRef>
+          <a:fillRef idx="0">
+            <a:schemeClr val="accent1"/>
+          </a:fillRef>
+          <a:effectRef idx="0">
+            <a:schemeClr val="accent1"/>
+          </a:effectRef>
+          <a:fontRef idx="minor">
+            <a:schemeClr val="tx1"/>
+          </a:fontRef>
+        </p:style>
+      </p:cxnSp>
+    </p:spTree>
+    <p:extLst>
+      <p:ext uri="{BB962C8B-B14F-4D97-AF65-F5344CB8AC3E}">
+        <p14:creationId xmlns:p14="http://schemas.microsoft.com/office/powerpoint/2010/main" val="2937402687"/>
       </p:ext>
     </p:extLst>
   </p:cSld>

</xml_diff>